<commit_message>
Gridlis test function added
</commit_message>
<xml_diff>
--- a/Descriptions/GridList.pptx
+++ b/Descriptions/GridList.pptx
@@ -244,7 +244,7 @@
           <a:p>
             <a:fld id="{9A42C61D-D669-4B9E-81E6-AA43D08BFCD1}" type="datetimeFigureOut">
               <a:rPr lang="de-CH" smtClean="0"/>
-              <a:t>24.10.2023</a:t>
+              <a:t>02.03.2024</a:t>
             </a:fld>
             <a:endParaRPr lang="de-CH"/>
           </a:p>
@@ -414,7 +414,7 @@
           <a:p>
             <a:fld id="{9A42C61D-D669-4B9E-81E6-AA43D08BFCD1}" type="datetimeFigureOut">
               <a:rPr lang="de-CH" smtClean="0"/>
-              <a:t>24.10.2023</a:t>
+              <a:t>02.03.2024</a:t>
             </a:fld>
             <a:endParaRPr lang="de-CH"/>
           </a:p>
@@ -594,7 +594,7 @@
           <a:p>
             <a:fld id="{9A42C61D-D669-4B9E-81E6-AA43D08BFCD1}" type="datetimeFigureOut">
               <a:rPr lang="de-CH" smtClean="0"/>
-              <a:t>24.10.2023</a:t>
+              <a:t>02.03.2024</a:t>
             </a:fld>
             <a:endParaRPr lang="de-CH"/>
           </a:p>
@@ -764,7 +764,7 @@
           <a:p>
             <a:fld id="{9A42C61D-D669-4B9E-81E6-AA43D08BFCD1}" type="datetimeFigureOut">
               <a:rPr lang="de-CH" smtClean="0"/>
-              <a:t>24.10.2023</a:t>
+              <a:t>02.03.2024</a:t>
             </a:fld>
             <a:endParaRPr lang="de-CH"/>
           </a:p>
@@ -1010,7 +1010,7 @@
           <a:p>
             <a:fld id="{9A42C61D-D669-4B9E-81E6-AA43D08BFCD1}" type="datetimeFigureOut">
               <a:rPr lang="de-CH" smtClean="0"/>
-              <a:t>24.10.2023</a:t>
+              <a:t>02.03.2024</a:t>
             </a:fld>
             <a:endParaRPr lang="de-CH"/>
           </a:p>
@@ -1242,7 +1242,7 @@
           <a:p>
             <a:fld id="{9A42C61D-D669-4B9E-81E6-AA43D08BFCD1}" type="datetimeFigureOut">
               <a:rPr lang="de-CH" smtClean="0"/>
-              <a:t>24.10.2023</a:t>
+              <a:t>02.03.2024</a:t>
             </a:fld>
             <a:endParaRPr lang="de-CH"/>
           </a:p>
@@ -1609,7 +1609,7 @@
           <a:p>
             <a:fld id="{9A42C61D-D669-4B9E-81E6-AA43D08BFCD1}" type="datetimeFigureOut">
               <a:rPr lang="de-CH" smtClean="0"/>
-              <a:t>24.10.2023</a:t>
+              <a:t>02.03.2024</a:t>
             </a:fld>
             <a:endParaRPr lang="de-CH"/>
           </a:p>
@@ -1727,7 +1727,7 @@
           <a:p>
             <a:fld id="{9A42C61D-D669-4B9E-81E6-AA43D08BFCD1}" type="datetimeFigureOut">
               <a:rPr lang="de-CH" smtClean="0"/>
-              <a:t>24.10.2023</a:t>
+              <a:t>02.03.2024</a:t>
             </a:fld>
             <a:endParaRPr lang="de-CH"/>
           </a:p>
@@ -1822,7 +1822,7 @@
           <a:p>
             <a:fld id="{9A42C61D-D669-4B9E-81E6-AA43D08BFCD1}" type="datetimeFigureOut">
               <a:rPr lang="de-CH" smtClean="0"/>
-              <a:t>24.10.2023</a:t>
+              <a:t>02.03.2024</a:t>
             </a:fld>
             <a:endParaRPr lang="de-CH"/>
           </a:p>
@@ -2099,7 +2099,7 @@
           <a:p>
             <a:fld id="{9A42C61D-D669-4B9E-81E6-AA43D08BFCD1}" type="datetimeFigureOut">
               <a:rPr lang="de-CH" smtClean="0"/>
-              <a:t>24.10.2023</a:t>
+              <a:t>02.03.2024</a:t>
             </a:fld>
             <a:endParaRPr lang="de-CH"/>
           </a:p>
@@ -2352,7 +2352,7 @@
           <a:p>
             <a:fld id="{9A42C61D-D669-4B9E-81E6-AA43D08BFCD1}" type="datetimeFigureOut">
               <a:rPr lang="de-CH" smtClean="0"/>
-              <a:t>24.10.2023</a:t>
+              <a:t>02.03.2024</a:t>
             </a:fld>
             <a:endParaRPr lang="de-CH"/>
           </a:p>
@@ -2565,7 +2565,7 @@
           <a:p>
             <a:fld id="{9A42C61D-D669-4B9E-81E6-AA43D08BFCD1}" type="datetimeFigureOut">
               <a:rPr lang="de-CH" smtClean="0"/>
-              <a:t>24.10.2023</a:t>
+              <a:t>02.03.2024</a:t>
             </a:fld>
             <a:endParaRPr lang="de-CH"/>
           </a:p>
@@ -5671,7 +5671,7 @@
         </p:nvSpPr>
         <p:spPr>
           <a:xfrm>
-            <a:off x="670815" y="4536678"/>
+            <a:off x="670815" y="3910510"/>
             <a:ext cx="9535866" cy="326039"/>
           </a:xfrm>
           <a:prstGeom prst="rect">
@@ -5729,7 +5729,7 @@
         </p:nvSpPr>
         <p:spPr>
           <a:xfrm>
-            <a:off x="670815" y="4518413"/>
+            <a:off x="670815" y="3892245"/>
             <a:ext cx="4524001" cy="215444"/>
           </a:xfrm>
           <a:prstGeom prst="rect">
@@ -5813,7 +5813,7 @@
         </p:nvSpPr>
         <p:spPr>
           <a:xfrm>
-            <a:off x="681115" y="4913815"/>
+            <a:off x="681115" y="4287647"/>
             <a:ext cx="9535866" cy="326039"/>
           </a:xfrm>
           <a:prstGeom prst="rect">
@@ -5871,7 +5871,7 @@
         </p:nvSpPr>
         <p:spPr>
           <a:xfrm>
-            <a:off x="681115" y="4895550"/>
+            <a:off x="681115" y="4269382"/>
             <a:ext cx="4524001" cy="215444"/>
           </a:xfrm>
           <a:prstGeom prst="rect">
@@ -6016,7 +6016,7 @@
         </p:nvCxnSpPr>
         <p:spPr>
           <a:xfrm>
-            <a:off x="5275096" y="5371070"/>
+            <a:off x="5275096" y="4744902"/>
             <a:ext cx="0" cy="671384"/>
           </a:xfrm>
           <a:prstGeom prst="line">
@@ -6044,194 +6044,6 @@
           </a:fontRef>
         </p:style>
       </p:cxnSp>
-      <p:sp>
-        <p:nvSpPr>
-          <p:cNvPr id="26" name="Textfeld 25">
-            <a:extLst>
-              <a:ext uri="{FF2B5EF4-FFF2-40B4-BE49-F238E27FC236}">
-                <a16:creationId xmlns:a16="http://schemas.microsoft.com/office/drawing/2014/main" id="{A2E024DE-4931-DBBB-313E-992BF17E936C}"/>
-              </a:ext>
-            </a:extLst>
-          </p:cNvPr>
-          <p:cNvSpPr txBox="1"/>
-          <p:nvPr/>
-        </p:nvSpPr>
-        <p:spPr>
-          <a:xfrm>
-            <a:off x="700859" y="4061932"/>
-            <a:ext cx="2615507" cy="215444"/>
-          </a:xfrm>
-          <a:prstGeom prst="rect">
-            <a:avLst/>
-          </a:prstGeom>
-          <a:noFill/>
-        </p:spPr>
-        <p:txBody>
-          <a:bodyPr wrap="square" rtlCol="0">
-            <a:spAutoFit/>
-          </a:bodyPr>
-          <a:lstStyle/>
-          <a:p>
-            <a:r>
-              <a:rPr lang="de-CH" sz="800" b="1" dirty="0" err="1">
-                <a:latin typeface="Arial" panose="020B0604020202020204" pitchFamily="34" charset="0"/>
-                <a:cs typeface="Arial" panose="020B0604020202020204" pitchFamily="34" charset="0"/>
-              </a:rPr>
-              <a:t>cl_div_jazz_guest_all</a:t>
-            </a:r>
-            <a:r>
-              <a:rPr lang="de-CH" sz="800" b="1" dirty="0">
-                <a:latin typeface="Arial" panose="020B0604020202020204" pitchFamily="34" charset="0"/>
-                <a:cs typeface="Arial" panose="020B0604020202020204" pitchFamily="34" charset="0"/>
-              </a:rPr>
-              <a:t>  w= 100%  </a:t>
-            </a:r>
-            <a:r>
-              <a:rPr lang="de-CH" sz="800" b="1" dirty="0" err="1">
-                <a:latin typeface="Arial" panose="020B0604020202020204" pitchFamily="34" charset="0"/>
-                <a:cs typeface="Arial" panose="020B0604020202020204" pitchFamily="34" charset="0"/>
-              </a:rPr>
-              <a:t>clear</a:t>
-            </a:r>
-            <a:r>
-              <a:rPr lang="de-CH" sz="800" b="1" dirty="0">
-                <a:latin typeface="Arial" panose="020B0604020202020204" pitchFamily="34" charset="0"/>
-                <a:cs typeface="Arial" panose="020B0604020202020204" pitchFamily="34" charset="0"/>
-              </a:rPr>
-              <a:t> </a:t>
-            </a:r>
-            <a:r>
-              <a:rPr lang="de-CH" sz="800" b="1" dirty="0" err="1">
-                <a:latin typeface="Arial" panose="020B0604020202020204" pitchFamily="34" charset="0"/>
-                <a:cs typeface="Arial" panose="020B0604020202020204" pitchFamily="34" charset="0"/>
-              </a:rPr>
-              <a:t>both</a:t>
-            </a:r>
-            <a:endParaRPr lang="de-CH" sz="800" b="1" dirty="0">
-              <a:latin typeface="Arial" panose="020B0604020202020204" pitchFamily="34" charset="0"/>
-              <a:cs typeface="Arial" panose="020B0604020202020204" pitchFamily="34" charset="0"/>
-            </a:endParaRPr>
-          </a:p>
-        </p:txBody>
-      </p:sp>
-      <p:sp>
-        <p:nvSpPr>
-          <p:cNvPr id="27" name="Rechteck 26">
-            <a:extLst>
-              <a:ext uri="{FF2B5EF4-FFF2-40B4-BE49-F238E27FC236}">
-                <a16:creationId xmlns:a16="http://schemas.microsoft.com/office/drawing/2014/main" id="{660FC0A8-A60A-5C95-FC0B-976C9C417FE1}"/>
-              </a:ext>
-            </a:extLst>
-          </p:cNvPr>
-          <p:cNvSpPr/>
-          <p:nvPr/>
-        </p:nvSpPr>
-        <p:spPr>
-          <a:xfrm>
-            <a:off x="728874" y="4018068"/>
-            <a:ext cx="9323347" cy="312755"/>
-          </a:xfrm>
-          <a:prstGeom prst="rect">
-            <a:avLst/>
-          </a:prstGeom>
-          <a:noFill/>
-          <a:ln>
-            <a:solidFill>
-              <a:schemeClr val="tx1"/>
-            </a:solidFill>
-          </a:ln>
-        </p:spPr>
-        <p:style>
-          <a:lnRef idx="2">
-            <a:schemeClr val="accent1">
-              <a:shade val="50000"/>
-            </a:schemeClr>
-          </a:lnRef>
-          <a:fillRef idx="1">
-            <a:schemeClr val="accent1"/>
-          </a:fillRef>
-          <a:effectRef idx="0">
-            <a:schemeClr val="accent1"/>
-          </a:effectRef>
-          <a:fontRef idx="minor">
-            <a:schemeClr val="lt1"/>
-          </a:fontRef>
-        </p:style>
-        <p:txBody>
-          <a:bodyPr rtlCol="0" anchor="ctr"/>
-          <a:lstStyle/>
-          <a:p>
-            <a:pPr algn="ctr"/>
-            <a:endParaRPr lang="de-CH" sz="1400" dirty="0">
-              <a:solidFill>
-                <a:schemeClr val="tx1"/>
-              </a:solidFill>
-              <a:latin typeface="Arial" panose="020B0604020202020204" pitchFamily="34" charset="0"/>
-              <a:cs typeface="Arial" panose="020B0604020202020204" pitchFamily="34" charset="0"/>
-            </a:endParaRPr>
-          </a:p>
-        </p:txBody>
-      </p:sp>
-      <p:pic>
-        <p:nvPicPr>
-          <p:cNvPr id="28" name="Grafik 27">
-            <a:extLst>
-              <a:ext uri="{FF2B5EF4-FFF2-40B4-BE49-F238E27FC236}">
-                <a16:creationId xmlns:a16="http://schemas.microsoft.com/office/drawing/2014/main" id="{038E7BCF-41DB-FD6E-0287-E1A77D6F97EA}"/>
-              </a:ext>
-            </a:extLst>
-          </p:cNvPr>
-          <p:cNvPicPr>
-            <a:picLocks noChangeAspect="1"/>
-          </p:cNvPicPr>
-          <p:nvPr/>
-        </p:nvPicPr>
-        <p:blipFill>
-          <a:blip r:embed="rId2"/>
-          <a:stretch>
-            <a:fillRect/>
-          </a:stretch>
-        </p:blipFill>
-        <p:spPr>
-          <a:xfrm>
-            <a:off x="4603785" y="4038976"/>
-            <a:ext cx="424081" cy="249147"/>
-          </a:xfrm>
-          <a:prstGeom prst="rect">
-            <a:avLst/>
-          </a:prstGeom>
-        </p:spPr>
-      </p:pic>
-      <p:pic>
-        <p:nvPicPr>
-          <p:cNvPr id="29" name="Grafik 28">
-            <a:extLst>
-              <a:ext uri="{FF2B5EF4-FFF2-40B4-BE49-F238E27FC236}">
-                <a16:creationId xmlns:a16="http://schemas.microsoft.com/office/drawing/2014/main" id="{BFCE0076-4E91-C369-2B76-568A29D92683}"/>
-              </a:ext>
-            </a:extLst>
-          </p:cNvPr>
-          <p:cNvPicPr>
-            <a:picLocks noChangeAspect="1"/>
-          </p:cNvPicPr>
-          <p:nvPr/>
-        </p:nvPicPr>
-        <p:blipFill>
-          <a:blip r:embed="rId3"/>
-          <a:stretch>
-            <a:fillRect/>
-          </a:stretch>
-        </p:blipFill>
-        <p:spPr>
-          <a:xfrm>
-            <a:off x="5117125" y="4045096"/>
-            <a:ext cx="469980" cy="236906"/>
-          </a:xfrm>
-          <a:prstGeom prst="rect">
-            <a:avLst/>
-          </a:prstGeom>
-        </p:spPr>
-      </p:pic>
       <p:sp>
         <p:nvSpPr>
           <p:cNvPr id="30" name="Rechteck 29">

</xml_diff>